<commit_message>
created folders and organised for self directed learning for MADD
</commit_message>
<xml_diff>
--- a/Physics/Lectures and Tutorials/Chapter3-Kinematics/MS864M_Chapter 3 - Kinematics_new design.pptx
+++ b/Physics/Lectures and Tutorials/Chapter3-Kinematics/MS864M_Chapter 3 - Kinematics_new design.pptx
@@ -251,7 +251,7 @@
           <a:p>
             <a:fld id="{3054530E-66E8-4EEF-8660-8A53FF529BDE}" type="datetimeFigureOut">
               <a:rPr lang="en-SG" smtClean="0"/>
-              <a:t>22/10/2018</a:t>
+              <a:t>5/11/2018</a:t>
             </a:fld>
             <a:endParaRPr lang="en-SG"/>
           </a:p>
@@ -2300,7 +2300,7 @@
           <a:p>
             <a:fld id="{C9C4BACD-157C-49D0-94EF-AA1F6A6AD876}" type="datetime1">
               <a:rPr lang="en-US" smtClean="0"/>
-              <a:t>10/22/2018</a:t>
+              <a:t>11/5/2018</a:t>
             </a:fld>
             <a:endParaRPr lang="en-US" dirty="0"/>
           </a:p>
@@ -2528,7 +2528,7 @@
           <a:p>
             <a:fld id="{2EA1A6BC-11B1-4E16-919A-AFB5EDCD6744}" type="datetime1">
               <a:rPr lang="en-US" smtClean="0"/>
-              <a:t>10/22/2018</a:t>
+              <a:t>11/5/2018</a:t>
             </a:fld>
             <a:endParaRPr lang="en-US" dirty="0"/>
           </a:p>
@@ -2721,7 +2721,7 @@
           <a:p>
             <a:fld id="{7D6B57A0-298C-4132-B714-B2E4F7F5DAD3}" type="datetime1">
               <a:rPr lang="en-US" smtClean="0"/>
-              <a:t>10/22/2018</a:t>
+              <a:t>11/5/2018</a:t>
             </a:fld>
             <a:endParaRPr lang="en-US" dirty="0"/>
           </a:p>
@@ -2945,7 +2945,7 @@
           <a:p>
             <a:fld id="{784773E5-5F31-491B-89B9-F93C36036A5D}" type="datetime1">
               <a:rPr lang="en-US" smtClean="0"/>
-              <a:t>10/22/2018</a:t>
+              <a:t>11/5/2018</a:t>
             </a:fld>
             <a:endParaRPr lang="en-US" dirty="0"/>
           </a:p>
@@ -3229,7 +3229,7 @@
           <a:p>
             <a:fld id="{53800E3F-A486-4059-9240-A559DDCADE81}" type="datetime1">
               <a:rPr lang="en-US" smtClean="0"/>
-              <a:t>10/22/2018</a:t>
+              <a:t>11/5/2018</a:t>
             </a:fld>
             <a:endParaRPr lang="en-US" dirty="0"/>
           </a:p>
@@ -3517,7 +3517,7 @@
           <a:p>
             <a:fld id="{A9CAAD29-F102-4008-BC34-B05BB0FD2B67}" type="datetime1">
               <a:rPr lang="en-US" smtClean="0"/>
-              <a:t>10/22/2018</a:t>
+              <a:t>11/5/2018</a:t>
             </a:fld>
             <a:endParaRPr lang="en-US" dirty="0"/>
           </a:p>
@@ -3897,7 +3897,7 @@
           <a:p>
             <a:fld id="{D93354DC-EF94-4EEC-9481-FB469B037A91}" type="datetime1">
               <a:rPr lang="en-US" smtClean="0"/>
-              <a:t>10/22/2018</a:t>
+              <a:t>11/5/2018</a:t>
             </a:fld>
             <a:endParaRPr lang="en-US" dirty="0"/>
           </a:p>
@@ -4016,7 +4016,7 @@
           <a:p>
             <a:fld id="{D9254362-7AEE-43C5-AEE4-AC33DABFA22C}" type="datetime1">
               <a:rPr lang="en-US" smtClean="0"/>
-              <a:t>10/22/2018</a:t>
+              <a:t>11/5/2018</a:t>
             </a:fld>
             <a:endParaRPr lang="en-US" dirty="0"/>
           </a:p>
@@ -4124,7 +4124,7 @@
           <a:p>
             <a:fld id="{11099A4A-02E7-4A08-B2C5-E4EBFFB64A84}" type="datetime1">
               <a:rPr lang="en-US" smtClean="0"/>
-              <a:t>10/22/2018</a:t>
+              <a:t>11/5/2018</a:t>
             </a:fld>
             <a:endParaRPr lang="en-US" dirty="0"/>
           </a:p>
@@ -4491,7 +4491,7 @@
           <a:p>
             <a:fld id="{39203F7C-D20A-49F8-B888-2E46A7855A5C}" type="datetime1">
               <a:rPr lang="en-US" smtClean="0"/>
-              <a:t>10/22/2018</a:t>
+              <a:t>11/5/2018</a:t>
             </a:fld>
             <a:endParaRPr lang="en-US" dirty="0"/>
           </a:p>
@@ -4874,7 +4874,7 @@
           <a:p>
             <a:fld id="{748DD5FD-15BD-4496-BE9E-D1DBB8EB5739}" type="datetime1">
               <a:rPr lang="en-US" smtClean="0"/>
-              <a:t>10/22/2018</a:t>
+              <a:t>11/5/2018</a:t>
             </a:fld>
             <a:endParaRPr lang="en-US" dirty="0"/>
           </a:p>
@@ -5084,7 +5084,7 @@
           <a:p>
             <a:fld id="{4D3E5F9C-F2B8-4D4B-8FB9-614589F410D4}" type="datetime1">
               <a:rPr lang="en-US" smtClean="0"/>
-              <a:t>10/22/2018</a:t>
+              <a:t>11/5/2018</a:t>
             </a:fld>
             <a:endParaRPr lang="en-US" dirty="0"/>
           </a:p>
@@ -5738,25 +5738,6 @@
       </p:sp>
       <p:sp>
         <p:nvSpPr>
-          <p:cNvPr id="3" name="Content Placeholder 2"/>
-          <p:cNvSpPr>
-            <a:spLocks noGrp="1"/>
-          </p:cNvSpPr>
-          <p:nvPr>
-            <p:ph idx="1"/>
-          </p:nvPr>
-        </p:nvSpPr>
-        <p:spPr/>
-        <p:txBody>
-          <a:bodyPr/>
-          <a:lstStyle/>
-          <a:p>
-            <a:endParaRPr lang="en-SG" dirty="0"/>
-          </a:p>
-        </p:txBody>
-      </p:sp>
-      <p:sp>
-        <p:nvSpPr>
           <p:cNvPr id="4" name="Slide Number Placeholder 3"/>
           <p:cNvSpPr>
             <a:spLocks noGrp="1"/>
@@ -5792,7 +5773,7 @@
           <p:nvPr>
             <p:extLst>
               <p:ext uri="{D42A27DB-BD31-4B8C-83A1-F6EECF244321}">
-                <p14:modId xmlns:p14="http://schemas.microsoft.com/office/powerpoint/2010/main" val="1671435239"/>
+                <p14:modId xmlns:p14="http://schemas.microsoft.com/office/powerpoint/2010/main" val="2157892423"/>
               </p:ext>
             </p:extLst>
           </p:nvPr>
@@ -5805,7 +5786,7 @@
           <a:graphicData uri="http://schemas.openxmlformats.org/presentationml/2006/ole">
             <mc:AlternateContent xmlns:mc="http://schemas.openxmlformats.org/markup-compatibility/2006">
               <mc:Choice xmlns:v="urn:schemas-microsoft-com:vml" Requires="v">
-                <p:oleObj spid="_x0000_s305390" name="Equation" r:id="rId3" imgW="3213000" imgH="711000" progId="Equation.DSMT4">
+                <p:oleObj spid="_x0000_s305402" name="Equation" r:id="rId3" imgW="3213000" imgH="711000" progId="Equation.DSMT4">
                   <p:embed/>
                 </p:oleObj>
               </mc:Choice>
@@ -5868,7 +5849,7 @@
           <a:graphicData uri="http://schemas.openxmlformats.org/presentationml/2006/ole">
             <mc:AlternateContent xmlns:mc="http://schemas.openxmlformats.org/markup-compatibility/2006">
               <mc:Choice xmlns:v="urn:schemas-microsoft-com:vml" Requires="v">
-                <p:oleObj spid="_x0000_s305391" name="Equation" r:id="rId5" imgW="3390840" imgH="711000" progId="Equation.DSMT4">
+                <p:oleObj spid="_x0000_s305403" name="Equation" r:id="rId5" imgW="3390840" imgH="711000" progId="Equation.DSMT4">
                   <p:embed/>
                 </p:oleObj>
               </mc:Choice>
@@ -6445,7 +6426,7 @@
             <a:graphicData uri="http://schemas.openxmlformats.org/presentationml/2006/ole">
               <mc:AlternateContent xmlns:mc="http://schemas.openxmlformats.org/markup-compatibility/2006">
                 <mc:Choice xmlns:v="urn:schemas-microsoft-com:vml" Requires="v">
-                  <p:oleObj spid="_x0000_s305392" name="Equation" r:id="rId8" imgW="342720" imgH="317160" progId="Equation.DSMT4">
+                  <p:oleObj spid="_x0000_s305404" name="Equation" r:id="rId8" imgW="342720" imgH="317160" progId="Equation.DSMT4">
                     <p:embed/>
                   </p:oleObj>
                 </mc:Choice>
@@ -7029,7 +7010,7 @@
             <a:graphicData uri="http://schemas.openxmlformats.org/presentationml/2006/ole">
               <mc:AlternateContent xmlns:mc="http://schemas.openxmlformats.org/markup-compatibility/2006">
                 <mc:Choice xmlns:v="urn:schemas-microsoft-com:vml" Requires="v">
-                  <p:oleObj spid="_x0000_s305393" name="Equation" r:id="rId10" imgW="482400" imgH="317160" progId="Equation.DSMT4">
+                  <p:oleObj spid="_x0000_s305405" name="Equation" r:id="rId10" imgW="482400" imgH="317160" progId="Equation.DSMT4">
                     <p:embed/>
                   </p:oleObj>
                 </mc:Choice>
@@ -7549,7 +7530,7 @@
           <a:graphicData uri="http://schemas.openxmlformats.org/presentationml/2006/ole">
             <mc:AlternateContent xmlns:mc="http://schemas.openxmlformats.org/markup-compatibility/2006">
               <mc:Choice xmlns:v="urn:schemas-microsoft-com:vml" Requires="v">
-                <p:oleObj spid="_x0000_s306236" name="Equation" r:id="rId3" imgW="2070000" imgH="787320" progId="Equation.DSMT4">
+                <p:oleObj spid="_x0000_s306239" name="Equation" r:id="rId3" imgW="2070000" imgH="787320" progId="Equation.DSMT4">
                   <p:embed/>
                 </p:oleObj>
               </mc:Choice>
@@ -8156,7 +8137,7 @@
           <a:graphicData uri="http://schemas.openxmlformats.org/presentationml/2006/ole">
             <mc:AlternateContent xmlns:mc="http://schemas.openxmlformats.org/markup-compatibility/2006">
               <mc:Choice xmlns:v="urn:schemas-microsoft-com:vml" Requires="v">
-                <p:oleObj spid="_x0000_s307258" name="Equation" r:id="rId3" imgW="6108480" imgH="2565360" progId="Equation.DSMT4">
+                <p:oleObj spid="_x0000_s307261" name="Equation" r:id="rId3" imgW="6108480" imgH="2565360" progId="Equation.DSMT4">
                   <p:embed/>
                 </p:oleObj>
               </mc:Choice>
@@ -8582,7 +8563,7 @@
           <a:graphicData uri="http://schemas.openxmlformats.org/presentationml/2006/ole">
             <mc:AlternateContent xmlns:mc="http://schemas.openxmlformats.org/markup-compatibility/2006">
               <mc:Choice xmlns:v="urn:schemas-microsoft-com:vml" Requires="v">
-                <p:oleObj spid="_x0000_s308394" name="Equation" r:id="rId3" imgW="3098520" imgH="406080" progId="Equation.DSMT4">
+                <p:oleObj spid="_x0000_s308403" name="Equation" r:id="rId3" imgW="3098520" imgH="406080" progId="Equation.DSMT4">
                   <p:embed/>
                 </p:oleObj>
               </mc:Choice>
@@ -8645,7 +8626,7 @@
           <a:graphicData uri="http://schemas.openxmlformats.org/presentationml/2006/ole">
             <mc:AlternateContent xmlns:mc="http://schemas.openxmlformats.org/markup-compatibility/2006">
               <mc:Choice xmlns:v="urn:schemas-microsoft-com:vml" Requires="v">
-                <p:oleObj spid="_x0000_s308395" name="Equation" r:id="rId5" imgW="1549080" imgH="380880" progId="Equation.DSMT4">
+                <p:oleObj spid="_x0000_s308404" name="Equation" r:id="rId5" imgW="1549080" imgH="380880" progId="Equation.DSMT4">
                   <p:embed/>
                 </p:oleObj>
               </mc:Choice>
@@ -8708,7 +8689,7 @@
           <a:graphicData uri="http://schemas.openxmlformats.org/presentationml/2006/ole">
             <mc:AlternateContent xmlns:mc="http://schemas.openxmlformats.org/markup-compatibility/2006">
               <mc:Choice xmlns:v="urn:schemas-microsoft-com:vml" Requires="v">
-                <p:oleObj spid="_x0000_s308396" name="Equation" r:id="rId7" imgW="1701720" imgH="380880" progId="Equation.DSMT4">
+                <p:oleObj spid="_x0000_s308405" name="Equation" r:id="rId7" imgW="1701720" imgH="380880" progId="Equation.DSMT4">
                   <p:embed/>
                 </p:oleObj>
               </mc:Choice>
@@ -9064,7 +9045,7 @@
           <a:graphicData uri="http://schemas.openxmlformats.org/presentationml/2006/ole">
             <mc:AlternateContent xmlns:mc="http://schemas.openxmlformats.org/markup-compatibility/2006">
               <mc:Choice xmlns:v="urn:schemas-microsoft-com:vml" Requires="v">
-                <p:oleObj spid="_x0000_s309419" name="Equation" r:id="rId3" imgW="2806560" imgH="863280" progId="Equation.DSMT4">
+                <p:oleObj spid="_x0000_s309428" name="Equation" r:id="rId3" imgW="2806560" imgH="863280" progId="Equation.DSMT4">
                   <p:embed/>
                 </p:oleObj>
               </mc:Choice>
@@ -9127,7 +9108,7 @@
           <a:graphicData uri="http://schemas.openxmlformats.org/presentationml/2006/ole">
             <mc:AlternateContent xmlns:mc="http://schemas.openxmlformats.org/markup-compatibility/2006">
               <mc:Choice xmlns:v="urn:schemas-microsoft-com:vml" Requires="v">
-                <p:oleObj spid="_x0000_s309420" name="Equation" r:id="rId5" imgW="482400" imgH="380880" progId="Equation.DSMT4">
+                <p:oleObj spid="_x0000_s309429" name="Equation" r:id="rId5" imgW="482400" imgH="380880" progId="Equation.DSMT4">
                   <p:embed/>
                 </p:oleObj>
               </mc:Choice>
@@ -9190,7 +9171,7 @@
           <a:graphicData uri="http://schemas.openxmlformats.org/presentationml/2006/ole">
             <mc:AlternateContent xmlns:mc="http://schemas.openxmlformats.org/markup-compatibility/2006">
               <mc:Choice xmlns:v="urn:schemas-microsoft-com:vml" Requires="v">
-                <p:oleObj spid="_x0000_s309421" name="Equation" r:id="rId7" imgW="317160" imgH="380880" progId="Equation.DSMT4">
+                <p:oleObj spid="_x0000_s309430" name="Equation" r:id="rId7" imgW="317160" imgH="380880" progId="Equation.DSMT4">
                   <p:embed/>
                 </p:oleObj>
               </mc:Choice>
@@ -9570,7 +9551,7 @@
           <a:graphicData uri="http://schemas.openxmlformats.org/presentationml/2006/ole">
             <mc:AlternateContent xmlns:mc="http://schemas.openxmlformats.org/markup-compatibility/2006">
               <mc:Choice xmlns:v="urn:schemas-microsoft-com:vml" Requires="v">
-                <p:oleObj spid="_x0000_s310376" name="Equation" r:id="rId3" imgW="1511280" imgH="723600" progId="Equation.DSMT4">
+                <p:oleObj spid="_x0000_s310382" name="Equation" r:id="rId3" imgW="1511280" imgH="723600" progId="Equation.DSMT4">
                   <p:embed/>
                 </p:oleObj>
               </mc:Choice>
@@ -9633,7 +9614,7 @@
           <a:graphicData uri="http://schemas.openxmlformats.org/presentationml/2006/ole">
             <mc:AlternateContent xmlns:mc="http://schemas.openxmlformats.org/markup-compatibility/2006">
               <mc:Choice xmlns:v="urn:schemas-microsoft-com:vml" Requires="v">
-                <p:oleObj spid="_x0000_s310377" name="Equation" r:id="rId5" imgW="3517560" imgH="380880" progId="Equation.DSMT4">
+                <p:oleObj spid="_x0000_s310383" name="Equation" r:id="rId5" imgW="3517560" imgH="380880" progId="Equation.DSMT4">
                   <p:embed/>
                 </p:oleObj>
               </mc:Choice>
@@ -9986,7 +9967,7 @@
           <a:graphicData uri="http://schemas.openxmlformats.org/presentationml/2006/ole">
             <mc:AlternateContent xmlns:mc="http://schemas.openxmlformats.org/markup-compatibility/2006">
               <mc:Choice xmlns:v="urn:schemas-microsoft-com:vml" Requires="v">
-                <p:oleObj spid="_x0000_s311448" name="Equation" r:id="rId3" imgW="1942920" imgH="723600" progId="Equation.DSMT4">
+                <p:oleObj spid="_x0000_s311457" name="Equation" r:id="rId3" imgW="1942920" imgH="723600" progId="Equation.DSMT4">
                   <p:embed/>
                 </p:oleObj>
               </mc:Choice>
@@ -10049,7 +10030,7 @@
           <a:graphicData uri="http://schemas.openxmlformats.org/presentationml/2006/ole">
             <mc:AlternateContent xmlns:mc="http://schemas.openxmlformats.org/markup-compatibility/2006">
               <mc:Choice xmlns:v="urn:schemas-microsoft-com:vml" Requires="v">
-                <p:oleObj spid="_x0000_s311449" name="Equation" r:id="rId5" imgW="2387520" imgH="723600" progId="Equation.DSMT4">
+                <p:oleObj spid="_x0000_s311458" name="Equation" r:id="rId5" imgW="2387520" imgH="723600" progId="Equation.DSMT4">
                   <p:embed/>
                 </p:oleObj>
               </mc:Choice>
@@ -10112,7 +10093,7 @@
           <a:graphicData uri="http://schemas.openxmlformats.org/presentationml/2006/ole">
             <mc:AlternateContent xmlns:mc="http://schemas.openxmlformats.org/markup-compatibility/2006">
               <mc:Choice xmlns:v="urn:schemas-microsoft-com:vml" Requires="v">
-                <p:oleObj spid="_x0000_s311450" name="Equation" r:id="rId7" imgW="2641320" imgH="723600" progId="Equation.DSMT4">
+                <p:oleObj spid="_x0000_s311459" name="Equation" r:id="rId7" imgW="2641320" imgH="723600" progId="Equation.DSMT4">
                   <p:embed/>
                 </p:oleObj>
               </mc:Choice>
@@ -10352,7 +10333,7 @@
           <a:graphicData uri="http://schemas.openxmlformats.org/presentationml/2006/ole">
             <mc:AlternateContent xmlns:mc="http://schemas.openxmlformats.org/markup-compatibility/2006">
               <mc:Choice xmlns:v="urn:schemas-microsoft-com:vml" Requires="v">
-                <p:oleObj spid="_x0000_s312466" name="Equation" r:id="rId3" imgW="2565360" imgH="469800" progId="Equation.DSMT4">
+                <p:oleObj spid="_x0000_s312475" name="Equation" r:id="rId3" imgW="2565360" imgH="469800" progId="Equation.DSMT4">
                   <p:embed/>
                 </p:oleObj>
               </mc:Choice>
@@ -10415,7 +10396,7 @@
           <a:graphicData uri="http://schemas.openxmlformats.org/presentationml/2006/ole">
             <mc:AlternateContent xmlns:mc="http://schemas.openxmlformats.org/markup-compatibility/2006">
               <mc:Choice xmlns:v="urn:schemas-microsoft-com:vml" Requires="v">
-                <p:oleObj spid="_x0000_s312467" name="Equation" r:id="rId5" imgW="1346040" imgH="799920" progId="Equation.DSMT4">
+                <p:oleObj spid="_x0000_s312476" name="Equation" r:id="rId5" imgW="1346040" imgH="799920" progId="Equation.DSMT4">
                   <p:embed/>
                 </p:oleObj>
               </mc:Choice>
@@ -10485,7 +10466,7 @@
           <a:graphicData uri="http://schemas.openxmlformats.org/presentationml/2006/ole">
             <mc:AlternateContent xmlns:mc="http://schemas.openxmlformats.org/markup-compatibility/2006">
               <mc:Choice xmlns:v="urn:schemas-microsoft-com:vml" Requires="v">
-                <p:oleObj spid="_x0000_s312468" name="Equation" r:id="rId7" imgW="2463480" imgH="723600" progId="Equation.DSMT4">
+                <p:oleObj spid="_x0000_s312477" name="Equation" r:id="rId7" imgW="2463480" imgH="723600" progId="Equation.DSMT4">
                   <p:embed/>
                 </p:oleObj>
               </mc:Choice>
@@ -14715,7 +14696,7 @@
           <a:graphicData uri="http://schemas.openxmlformats.org/presentationml/2006/ole">
             <mc:AlternateContent xmlns:mc="http://schemas.openxmlformats.org/markup-compatibility/2006">
               <mc:Choice xmlns:v="urn:schemas-microsoft-com:vml" Requires="v">
-                <p:oleObj spid="_x0000_s313385" name="Equation" r:id="rId3" imgW="2387520" imgH="1726920" progId="Equation.DSMT4">
+                <p:oleObj spid="_x0000_s313388" name="Equation" r:id="rId3" imgW="2387520" imgH="1726920" progId="Equation.DSMT4">
                   <p:embed/>
                 </p:oleObj>
               </mc:Choice>
@@ -14989,7 +14970,7 @@
           <a:graphicData uri="http://schemas.openxmlformats.org/presentationml/2006/ole">
             <mc:AlternateContent xmlns:mc="http://schemas.openxmlformats.org/markup-compatibility/2006">
               <mc:Choice xmlns:v="urn:schemas-microsoft-com:vml" Requires="v">
-                <p:oleObj spid="_x0000_s314408" name="Equation" r:id="rId4" imgW="1117440" imgH="863280" progId="Equation.DSMT4">
+                <p:oleObj spid="_x0000_s314411" name="Equation" r:id="rId4" imgW="1117440" imgH="863280" progId="Equation.DSMT4">
                   <p:embed/>
                 </p:oleObj>
               </mc:Choice>
@@ -17089,7 +17070,7 @@
           <a:graphicData uri="http://schemas.openxmlformats.org/presentationml/2006/ole">
             <mc:AlternateContent xmlns:mc="http://schemas.openxmlformats.org/markup-compatibility/2006">
               <mc:Choice xmlns:v="urn:schemas-microsoft-com:vml" Requires="v">
-                <p:oleObj spid="_x0000_s315431" name="Equation" r:id="rId3" imgW="977760" imgH="787320" progId="Equation.DSMT4">
+                <p:oleObj spid="_x0000_s315434" name="Equation" r:id="rId3" imgW="977760" imgH="787320" progId="Equation.DSMT4">
                   <p:embed/>
                 </p:oleObj>
               </mc:Choice>
@@ -18241,7 +18222,7 @@
             <a:graphicData uri="http://schemas.openxmlformats.org/presentationml/2006/ole">
               <mc:AlternateContent xmlns:mc="http://schemas.openxmlformats.org/markup-compatibility/2006">
                 <mc:Choice xmlns:v="urn:schemas-microsoft-com:vml" Requires="v">
-                  <p:oleObj spid="_x0000_s316670" name="Equation" r:id="rId3" imgW="177480" imgH="241200" progId="Equation.DSMT4">
+                  <p:oleObj spid="_x0000_s316691" name="Equation" r:id="rId3" imgW="177480" imgH="241200" progId="Equation.DSMT4">
                     <p:embed/>
                   </p:oleObj>
                 </mc:Choice>
@@ -18311,7 +18292,7 @@
             <a:graphicData uri="http://schemas.openxmlformats.org/presentationml/2006/ole">
               <mc:AlternateContent xmlns:mc="http://schemas.openxmlformats.org/markup-compatibility/2006">
                 <mc:Choice xmlns:v="urn:schemas-microsoft-com:vml" Requires="v">
-                  <p:oleObj spid="_x0000_s316671" name="Equation" r:id="rId5" imgW="177480" imgH="355320" progId="Equation.DSMT4">
+                  <p:oleObj spid="_x0000_s316692" name="Equation" r:id="rId5" imgW="177480" imgH="355320" progId="Equation.DSMT4">
                     <p:embed/>
                   </p:oleObj>
                 </mc:Choice>
@@ -18382,7 +18363,7 @@
           <a:graphicData uri="http://schemas.openxmlformats.org/presentationml/2006/ole">
             <mc:AlternateContent xmlns:mc="http://schemas.openxmlformats.org/markup-compatibility/2006">
               <mc:Choice xmlns:v="urn:schemas-microsoft-com:vml" Requires="v">
-                <p:oleObj spid="_x0000_s316672" name="Equation" r:id="rId7" imgW="1574640" imgH="533160" progId="Equation.DSMT4">
+                <p:oleObj spid="_x0000_s316693" name="Equation" r:id="rId7" imgW="1574640" imgH="533160" progId="Equation.DSMT4">
                   <p:embed/>
                 </p:oleObj>
               </mc:Choice>
@@ -18444,7 +18425,7 @@
           <a:graphicData uri="http://schemas.openxmlformats.org/presentationml/2006/ole">
             <mc:AlternateContent xmlns:mc="http://schemas.openxmlformats.org/markup-compatibility/2006">
               <mc:Choice xmlns:v="urn:schemas-microsoft-com:vml" Requires="v">
-                <p:oleObj spid="_x0000_s316673" name="Equation" r:id="rId9" imgW="1307880" imgH="723600" progId="Equation.DSMT4">
+                <p:oleObj spid="_x0000_s316694" name="Equation" r:id="rId9" imgW="1307880" imgH="723600" progId="Equation.DSMT4">
                   <p:embed/>
                 </p:oleObj>
               </mc:Choice>
@@ -18514,7 +18495,7 @@
           <a:graphicData uri="http://schemas.openxmlformats.org/presentationml/2006/ole">
             <mc:AlternateContent xmlns:mc="http://schemas.openxmlformats.org/markup-compatibility/2006">
               <mc:Choice xmlns:v="urn:schemas-microsoft-com:vml" Requires="v">
-                <p:oleObj spid="_x0000_s316674" name="Equation" r:id="rId11" imgW="1346040" imgH="444240" progId="Equation.DSMT4">
+                <p:oleObj spid="_x0000_s316695" name="Equation" r:id="rId11" imgW="1346040" imgH="444240" progId="Equation.DSMT4">
                   <p:embed/>
                 </p:oleObj>
               </mc:Choice>
@@ -18576,7 +18557,7 @@
           <a:graphicData uri="http://schemas.openxmlformats.org/presentationml/2006/ole">
             <mc:AlternateContent xmlns:mc="http://schemas.openxmlformats.org/markup-compatibility/2006">
               <mc:Choice xmlns:v="urn:schemas-microsoft-com:vml" Requires="v">
-                <p:oleObj spid="_x0000_s316675" name="Equation" r:id="rId13" imgW="177480" imgH="355320" progId="Equation.DSMT4">
+                <p:oleObj spid="_x0000_s316696" name="Equation" r:id="rId13" imgW="177480" imgH="355320" progId="Equation.DSMT4">
                   <p:embed/>
                 </p:oleObj>
               </mc:Choice>
@@ -18638,7 +18619,7 @@
           <a:graphicData uri="http://schemas.openxmlformats.org/presentationml/2006/ole">
             <mc:AlternateContent xmlns:mc="http://schemas.openxmlformats.org/markup-compatibility/2006">
               <mc:Choice xmlns:v="urn:schemas-microsoft-com:vml" Requires="v">
-                <p:oleObj spid="_x0000_s316676" name="Equation" r:id="rId15" imgW="177480" imgH="355320" progId="Equation.DSMT4">
+                <p:oleObj spid="_x0000_s316697" name="Equation" r:id="rId15" imgW="177480" imgH="355320" progId="Equation.DSMT4">
                   <p:embed/>
                 </p:oleObj>
               </mc:Choice>
@@ -18956,7 +18937,7 @@
           <a:graphicData uri="http://schemas.openxmlformats.org/presentationml/2006/ole">
             <mc:AlternateContent xmlns:mc="http://schemas.openxmlformats.org/markup-compatibility/2006">
               <mc:Choice xmlns:v="urn:schemas-microsoft-com:vml" Requires="v">
-                <p:oleObj spid="_x0000_s317827" name="Equation" r:id="rId3" imgW="3441600" imgH="545760" progId="Equation.DSMT4">
+                <p:oleObj spid="_x0000_s317860" name="Equation" r:id="rId3" imgW="3441600" imgH="545760" progId="Equation.DSMT4">
                   <p:embed/>
                 </p:oleObj>
               </mc:Choice>
@@ -19026,7 +19007,7 @@
           <a:graphicData uri="http://schemas.openxmlformats.org/presentationml/2006/ole">
             <mc:AlternateContent xmlns:mc="http://schemas.openxmlformats.org/markup-compatibility/2006">
               <mc:Choice xmlns:v="urn:schemas-microsoft-com:vml" Requires="v">
-                <p:oleObj spid="_x0000_s317828" name="Equation" r:id="rId5" imgW="1473120" imgH="723600" progId="Equation.DSMT4">
+                <p:oleObj spid="_x0000_s317861" name="Equation" r:id="rId5" imgW="1473120" imgH="723600" progId="Equation.DSMT4">
                   <p:embed/>
                 </p:oleObj>
               </mc:Choice>
@@ -19096,7 +19077,7 @@
           <a:graphicData uri="http://schemas.openxmlformats.org/presentationml/2006/ole">
             <mc:AlternateContent xmlns:mc="http://schemas.openxmlformats.org/markup-compatibility/2006">
               <mc:Choice xmlns:v="urn:schemas-microsoft-com:vml" Requires="v">
-                <p:oleObj spid="_x0000_s317829" name="Equation" r:id="rId7" imgW="380880" imgH="355320" progId="Equation.DSMT4">
+                <p:oleObj spid="_x0000_s317862" name="Equation" r:id="rId7" imgW="380880" imgH="355320" progId="Equation.DSMT4">
                   <p:embed/>
                 </p:oleObj>
               </mc:Choice>
@@ -19158,7 +19139,7 @@
           <a:graphicData uri="http://schemas.openxmlformats.org/presentationml/2006/ole">
             <mc:AlternateContent xmlns:mc="http://schemas.openxmlformats.org/markup-compatibility/2006">
               <mc:Choice xmlns:v="urn:schemas-microsoft-com:vml" Requires="v">
-                <p:oleObj spid="_x0000_s317830" name="Equation" r:id="rId9" imgW="1371600" imgH="380880" progId="Equation.DSMT4">
+                <p:oleObj spid="_x0000_s317863" name="Equation" r:id="rId9" imgW="1371600" imgH="380880" progId="Equation.DSMT4">
                   <p:embed/>
                 </p:oleObj>
               </mc:Choice>
@@ -19220,7 +19201,7 @@
           <a:graphicData uri="http://schemas.openxmlformats.org/presentationml/2006/ole">
             <mc:AlternateContent xmlns:mc="http://schemas.openxmlformats.org/markup-compatibility/2006">
               <mc:Choice xmlns:v="urn:schemas-microsoft-com:vml" Requires="v">
-                <p:oleObj spid="_x0000_s317831" name="Equation" r:id="rId11" imgW="279360" imgH="380880" progId="Equation.DSMT4">
+                <p:oleObj spid="_x0000_s317864" name="Equation" r:id="rId11" imgW="279360" imgH="380880" progId="Equation.DSMT4">
                   <p:embed/>
                 </p:oleObj>
               </mc:Choice>
@@ -19697,7 +19678,7 @@
             <a:graphicData uri="http://schemas.openxmlformats.org/presentationml/2006/ole">
               <mc:AlternateContent xmlns:mc="http://schemas.openxmlformats.org/markup-compatibility/2006">
                 <mc:Choice xmlns:v="urn:schemas-microsoft-com:vml" Requires="v">
-                  <p:oleObj spid="_x0000_s317832" name="Equation" r:id="rId13" imgW="177480" imgH="241200" progId="Equation.DSMT4">
+                  <p:oleObj spid="_x0000_s317865" name="Equation" r:id="rId13" imgW="177480" imgH="241200" progId="Equation.DSMT4">
                     <p:embed/>
                   </p:oleObj>
                 </mc:Choice>
@@ -19903,7 +19884,7 @@
             <a:graphicData uri="http://schemas.openxmlformats.org/presentationml/2006/ole">
               <mc:AlternateContent xmlns:mc="http://schemas.openxmlformats.org/markup-compatibility/2006">
                 <mc:Choice xmlns:v="urn:schemas-microsoft-com:vml" Requires="v">
-                  <p:oleObj spid="_x0000_s317833" name="Equation" r:id="rId15" imgW="330120" imgH="304560" progId="Equation.DSMT4">
+                  <p:oleObj spid="_x0000_s317866" name="Equation" r:id="rId15" imgW="330120" imgH="304560" progId="Equation.DSMT4">
                     <p:embed/>
                   </p:oleObj>
                 </mc:Choice>
@@ -19965,7 +19946,7 @@
             <a:graphicData uri="http://schemas.openxmlformats.org/presentationml/2006/ole">
               <mc:AlternateContent xmlns:mc="http://schemas.openxmlformats.org/markup-compatibility/2006">
                 <mc:Choice xmlns:v="urn:schemas-microsoft-com:vml" Requires="v">
-                  <p:oleObj spid="_x0000_s317834" name="Equation" r:id="rId17" imgW="241200" imgH="317160" progId="Equation.DSMT4">
+                  <p:oleObj spid="_x0000_s317867" name="Equation" r:id="rId17" imgW="241200" imgH="317160" progId="Equation.DSMT4">
                     <p:embed/>
                   </p:oleObj>
                 </mc:Choice>
@@ -20027,7 +20008,7 @@
             <a:graphicData uri="http://schemas.openxmlformats.org/presentationml/2006/ole">
               <mc:AlternateContent xmlns:mc="http://schemas.openxmlformats.org/markup-compatibility/2006">
                 <mc:Choice xmlns:v="urn:schemas-microsoft-com:vml" Requires="v">
-                  <p:oleObj spid="_x0000_s317835" name="Equation" r:id="rId19" imgW="215640" imgH="317160" progId="Equation.DSMT4">
+                  <p:oleObj spid="_x0000_s317868" name="Equation" r:id="rId19" imgW="215640" imgH="317160" progId="Equation.DSMT4">
                     <p:embed/>
                   </p:oleObj>
                 </mc:Choice>
@@ -20164,7 +20145,7 @@
           <a:graphicData uri="http://schemas.openxmlformats.org/presentationml/2006/ole">
             <mc:AlternateContent xmlns:mc="http://schemas.openxmlformats.org/markup-compatibility/2006">
               <mc:Choice xmlns:v="urn:schemas-microsoft-com:vml" Requires="v">
-                <p:oleObj spid="_x0000_s317836" name="Equation" r:id="rId21" imgW="253800" imgH="380880" progId="Equation.DSMT4">
+                <p:oleObj spid="_x0000_s317869" name="Equation" r:id="rId21" imgW="253800" imgH="380880" progId="Equation.DSMT4">
                   <p:embed/>
                 </p:oleObj>
               </mc:Choice>
@@ -20226,7 +20207,7 @@
           <a:graphicData uri="http://schemas.openxmlformats.org/presentationml/2006/ole">
             <mc:AlternateContent xmlns:mc="http://schemas.openxmlformats.org/markup-compatibility/2006">
               <mc:Choice xmlns:v="urn:schemas-microsoft-com:vml" Requires="v">
-                <p:oleObj spid="_x0000_s317837" name="Equation" r:id="rId23" imgW="380880" imgH="355320" progId="Equation.DSMT4">
+                <p:oleObj spid="_x0000_s317870" name="Equation" r:id="rId23" imgW="380880" imgH="355320" progId="Equation.DSMT4">
                   <p:embed/>
                 </p:oleObj>
               </mc:Choice>
@@ -20887,7 +20868,7 @@
             <a:graphicData uri="http://schemas.openxmlformats.org/presentationml/2006/ole">
               <mc:AlternateContent xmlns:mc="http://schemas.openxmlformats.org/markup-compatibility/2006">
                 <mc:Choice xmlns:v="urn:schemas-microsoft-com:vml" Requires="v">
-                  <p:oleObj spid="_x0000_s318806" name="Equation" r:id="rId3" imgW="177480" imgH="241200" progId="Equation.DSMT4">
+                  <p:oleObj spid="_x0000_s318836" name="Equation" r:id="rId3" imgW="177480" imgH="241200" progId="Equation.DSMT4">
                     <p:embed/>
                   </p:oleObj>
                 </mc:Choice>
@@ -21093,7 +21074,7 @@
             <a:graphicData uri="http://schemas.openxmlformats.org/presentationml/2006/ole">
               <mc:AlternateContent xmlns:mc="http://schemas.openxmlformats.org/markup-compatibility/2006">
                 <mc:Choice xmlns:v="urn:schemas-microsoft-com:vml" Requires="v">
-                  <p:oleObj spid="_x0000_s318807" name="Equation" r:id="rId5" imgW="330120" imgH="304560" progId="Equation.DSMT4">
+                  <p:oleObj spid="_x0000_s318837" name="Equation" r:id="rId5" imgW="330120" imgH="304560" progId="Equation.DSMT4">
                     <p:embed/>
                   </p:oleObj>
                 </mc:Choice>
@@ -21155,7 +21136,7 @@
             <a:graphicData uri="http://schemas.openxmlformats.org/presentationml/2006/ole">
               <mc:AlternateContent xmlns:mc="http://schemas.openxmlformats.org/markup-compatibility/2006">
                 <mc:Choice xmlns:v="urn:schemas-microsoft-com:vml" Requires="v">
-                  <p:oleObj spid="_x0000_s318808" name="Equation" r:id="rId7" imgW="241200" imgH="317160" progId="Equation.DSMT4">
+                  <p:oleObj spid="_x0000_s318838" name="Equation" r:id="rId7" imgW="241200" imgH="317160" progId="Equation.DSMT4">
                     <p:embed/>
                   </p:oleObj>
                 </mc:Choice>
@@ -21217,7 +21198,7 @@
             <a:graphicData uri="http://schemas.openxmlformats.org/presentationml/2006/ole">
               <mc:AlternateContent xmlns:mc="http://schemas.openxmlformats.org/markup-compatibility/2006">
                 <mc:Choice xmlns:v="urn:schemas-microsoft-com:vml" Requires="v">
-                  <p:oleObj spid="_x0000_s318809" name="Equation" r:id="rId9" imgW="215640" imgH="317160" progId="Equation.DSMT4">
+                  <p:oleObj spid="_x0000_s318839" name="Equation" r:id="rId9" imgW="215640" imgH="317160" progId="Equation.DSMT4">
                     <p:embed/>
                   </p:oleObj>
                 </mc:Choice>
@@ -21390,7 +21371,7 @@
             <a:graphicData uri="http://schemas.openxmlformats.org/presentationml/2006/ole">
               <mc:AlternateContent xmlns:mc="http://schemas.openxmlformats.org/markup-compatibility/2006">
                 <mc:Choice xmlns:v="urn:schemas-microsoft-com:vml" Requires="v">
-                  <p:oleObj spid="_x0000_s318810" name="Equation" r:id="rId11" imgW="317160" imgH="330120" progId="Equation.DSMT4">
+                  <p:oleObj spid="_x0000_s318840" name="Equation" r:id="rId11" imgW="317160" imgH="330120" progId="Equation.DSMT4">
                     <p:embed/>
                   </p:oleObj>
                 </mc:Choice>
@@ -21453,7 +21434,7 @@
           <a:graphicData uri="http://schemas.openxmlformats.org/presentationml/2006/ole">
             <mc:AlternateContent xmlns:mc="http://schemas.openxmlformats.org/markup-compatibility/2006">
               <mc:Choice xmlns:v="urn:schemas-microsoft-com:vml" Requires="v">
-                <p:oleObj spid="_x0000_s318811" name="Equation" r:id="rId13" imgW="1066680" imgH="787320" progId="Equation.DSMT4">
+                <p:oleObj spid="_x0000_s318841" name="Equation" r:id="rId13" imgW="1066680" imgH="787320" progId="Equation.DSMT4">
                   <p:embed/>
                 </p:oleObj>
               </mc:Choice>
@@ -21523,7 +21504,7 @@
           <a:graphicData uri="http://schemas.openxmlformats.org/presentationml/2006/ole">
             <mc:AlternateContent xmlns:mc="http://schemas.openxmlformats.org/markup-compatibility/2006">
               <mc:Choice xmlns:v="urn:schemas-microsoft-com:vml" Requires="v">
-                <p:oleObj spid="_x0000_s318812" name="Equation" r:id="rId15" imgW="2171520" imgH="583920" progId="Equation.DSMT4">
+                <p:oleObj spid="_x0000_s318842" name="Equation" r:id="rId15" imgW="2171520" imgH="583920" progId="Equation.DSMT4">
                   <p:embed/>
                 </p:oleObj>
               </mc:Choice>
@@ -21593,7 +21574,7 @@
           <a:graphicData uri="http://schemas.openxmlformats.org/presentationml/2006/ole">
             <mc:AlternateContent xmlns:mc="http://schemas.openxmlformats.org/markup-compatibility/2006">
               <mc:Choice xmlns:v="urn:schemas-microsoft-com:vml" Requires="v">
-                <p:oleObj spid="_x0000_s318813" name="Equation" r:id="rId17" imgW="380880" imgH="355320" progId="Equation.DSMT4">
+                <p:oleObj spid="_x0000_s318843" name="Equation" r:id="rId17" imgW="380880" imgH="355320" progId="Equation.DSMT4">
                   <p:embed/>
                 </p:oleObj>
               </mc:Choice>
@@ -21663,7 +21644,7 @@
           <a:graphicData uri="http://schemas.openxmlformats.org/presentationml/2006/ole">
             <mc:AlternateContent xmlns:mc="http://schemas.openxmlformats.org/markup-compatibility/2006">
               <mc:Choice xmlns:v="urn:schemas-microsoft-com:vml" Requires="v">
-                <p:oleObj spid="_x0000_s318814" name="Equation" r:id="rId19" imgW="368280" imgH="380880" progId="Equation.DSMT4">
+                <p:oleObj spid="_x0000_s318844" name="Equation" r:id="rId19" imgW="368280" imgH="380880" progId="Equation.DSMT4">
                   <p:embed/>
                 </p:oleObj>
               </mc:Choice>
@@ -21725,7 +21706,7 @@
           <a:graphicData uri="http://schemas.openxmlformats.org/presentationml/2006/ole">
             <mc:AlternateContent xmlns:mc="http://schemas.openxmlformats.org/markup-compatibility/2006">
               <mc:Choice xmlns:v="urn:schemas-microsoft-com:vml" Requires="v">
-                <p:oleObj spid="_x0000_s318815" name="Equation" r:id="rId21" imgW="368280" imgH="380880" progId="Equation.DSMT4">
+                <p:oleObj spid="_x0000_s318845" name="Equation" r:id="rId21" imgW="368280" imgH="380880" progId="Equation.DSMT4">
                   <p:embed/>
                 </p:oleObj>
               </mc:Choice>
@@ -22009,7 +21990,7 @@
           <a:graphicData uri="http://schemas.openxmlformats.org/presentationml/2006/ole">
             <mc:AlternateContent xmlns:mc="http://schemas.openxmlformats.org/markup-compatibility/2006">
               <mc:Choice xmlns:v="urn:schemas-microsoft-com:vml" Requires="v">
-                <p:oleObj spid="_x0000_s319589" name="Equation" r:id="rId4" imgW="1968480" imgH="787320" progId="Equation.DSMT4">
+                <p:oleObj spid="_x0000_s319598" name="Equation" r:id="rId4" imgW="1968480" imgH="787320" progId="Equation.DSMT4">
                   <p:embed/>
                 </p:oleObj>
               </mc:Choice>
@@ -22079,7 +22060,7 @@
           <a:graphicData uri="http://schemas.openxmlformats.org/presentationml/2006/ole">
             <mc:AlternateContent xmlns:mc="http://schemas.openxmlformats.org/markup-compatibility/2006">
               <mc:Choice xmlns:v="urn:schemas-microsoft-com:vml" Requires="v">
-                <p:oleObj spid="_x0000_s319590" name="Equation" r:id="rId6" imgW="1968480" imgH="444240" progId="Equation.DSMT4">
+                <p:oleObj spid="_x0000_s319599" name="Equation" r:id="rId6" imgW="1968480" imgH="444240" progId="Equation.DSMT4">
                   <p:embed/>
                 </p:oleObj>
               </mc:Choice>
@@ -22149,7 +22130,7 @@
           <a:graphicData uri="http://schemas.openxmlformats.org/presentationml/2006/ole">
             <mc:AlternateContent xmlns:mc="http://schemas.openxmlformats.org/markup-compatibility/2006">
               <mc:Choice xmlns:v="urn:schemas-microsoft-com:vml" Requires="v">
-                <p:oleObj spid="_x0000_s319591" name="Equation" r:id="rId8" imgW="177480" imgH="368280" progId="Equation.DSMT4">
+                <p:oleObj spid="_x0000_s319600" name="Equation" r:id="rId8" imgW="177480" imgH="368280" progId="Equation.DSMT4">
                   <p:embed/>
                 </p:oleObj>
               </mc:Choice>
@@ -22771,7 +22752,7 @@
           <a:graphicData uri="http://schemas.openxmlformats.org/presentationml/2006/ole">
             <mc:AlternateContent xmlns:mc="http://schemas.openxmlformats.org/markup-compatibility/2006">
               <mc:Choice xmlns:v="urn:schemas-microsoft-com:vml" Requires="v">
-                <p:oleObj spid="_x0000_s320574" name="Equation" r:id="rId3" imgW="2184120" imgH="863280" progId="Equation.DSMT4">
+                <p:oleObj spid="_x0000_s320580" name="Equation" r:id="rId3" imgW="2184120" imgH="863280" progId="Equation.DSMT4">
                   <p:embed/>
                 </p:oleObj>
               </mc:Choice>
@@ -22841,7 +22822,7 @@
           <a:graphicData uri="http://schemas.openxmlformats.org/presentationml/2006/ole">
             <mc:AlternateContent xmlns:mc="http://schemas.openxmlformats.org/markup-compatibility/2006">
               <mc:Choice xmlns:v="urn:schemas-microsoft-com:vml" Requires="v">
-                <p:oleObj spid="_x0000_s320575" name="Equation" r:id="rId5" imgW="380880" imgH="368280" progId="Equation.DSMT4">
+                <p:oleObj spid="_x0000_s320581" name="Equation" r:id="rId5" imgW="380880" imgH="368280" progId="Equation.DSMT4">
                   <p:embed/>
                 </p:oleObj>
               </mc:Choice>
@@ -23120,7 +23101,7 @@
           <a:graphicData uri="http://schemas.openxmlformats.org/presentationml/2006/ole">
             <mc:AlternateContent xmlns:mc="http://schemas.openxmlformats.org/markup-compatibility/2006">
               <mc:Choice xmlns:v="urn:schemas-microsoft-com:vml" Requires="v">
-                <p:oleObj spid="_x0000_s324662" name="Equation" r:id="rId3" imgW="2743200" imgH="863280" progId="Equation.DSMT4">
+                <p:oleObj spid="_x0000_s324668" name="Equation" r:id="rId3" imgW="2743200" imgH="863280" progId="Equation.DSMT4">
                   <p:embed/>
                 </p:oleObj>
               </mc:Choice>
@@ -23214,7 +23195,7 @@
           <a:graphicData uri="http://schemas.openxmlformats.org/presentationml/2006/ole">
             <mc:AlternateContent xmlns:mc="http://schemas.openxmlformats.org/markup-compatibility/2006">
               <mc:Choice xmlns:v="urn:schemas-microsoft-com:vml" Requires="v">
-                <p:oleObj spid="_x0000_s324663" name="Equation" r:id="rId6" imgW="3733560" imgH="1473120" progId="Equation.DSMT4">
+                <p:oleObj spid="_x0000_s324669" name="Equation" r:id="rId6" imgW="3733560" imgH="1473120" progId="Equation.DSMT4">
                   <p:embed/>
                 </p:oleObj>
               </mc:Choice>
@@ -23441,7 +23422,7 @@
                   <a:srgbClr val="FF0000"/>
                 </a:solidFill>
               </a:rPr>
-              <a:t>vector     </a:t>
+              <a:t>vector      </a:t>
             </a:r>
             <a:r>
               <a:rPr lang="en-US" sz="2400" dirty="0">
@@ -23795,7 +23776,7 @@
             <a:graphicData uri="http://schemas.openxmlformats.org/presentationml/2006/ole">
               <mc:AlternateContent xmlns:mc="http://schemas.openxmlformats.org/markup-compatibility/2006">
                 <mc:Choice xmlns:v="urn:schemas-microsoft-com:vml" Requires="v">
-                  <p:oleObj spid="_x0000_s264314" name="Equation" r:id="rId3" imgW="177480" imgH="317160" progId="Equation.DSMT4">
+                  <p:oleObj spid="_x0000_s264320" name="Equation" r:id="rId3" imgW="177480" imgH="317160" progId="Equation.DSMT4">
                     <p:embed/>
                   </p:oleObj>
                 </mc:Choice>
@@ -23846,20 +23827,20 @@
           <p:nvPr>
             <p:extLst>
               <p:ext uri="{D42A27DB-BD31-4B8C-83A1-F6EECF244321}">
-                <p14:modId xmlns:p14="http://schemas.microsoft.com/office/powerpoint/2010/main" val="1972861305"/>
+                <p14:modId xmlns:p14="http://schemas.microsoft.com/office/powerpoint/2010/main" val="529120703"/>
               </p:ext>
             </p:extLst>
           </p:nvPr>
         </p:nvGraphicFramePr>
         <p:xfrm>
-          <a:off x="5484813" y="3303242"/>
-          <a:ext cx="190500" cy="368300"/>
+          <a:off x="5448824" y="3031304"/>
+          <a:ext cx="397854" cy="640238"/>
         </p:xfrm>
         <a:graphic>
           <a:graphicData uri="http://schemas.openxmlformats.org/presentationml/2006/ole">
             <mc:AlternateContent xmlns:mc="http://schemas.openxmlformats.org/markup-compatibility/2006">
               <mc:Choice xmlns:v="urn:schemas-microsoft-com:vml" Requires="v">
-                <p:oleObj spid="_x0000_s264315" name="Equation" r:id="rId5" imgW="190440" imgH="368280" progId="Equation.DSMT4">
+                <p:oleObj spid="_x0000_s264321" name="Equation" r:id="rId5" imgW="190440" imgH="368280" progId="Equation.DSMT4">
                   <p:embed/>
                 </p:oleObj>
               </mc:Choice>
@@ -23883,8 +23864,8 @@
                     </p:blipFill>
                     <p:spPr bwMode="auto">
                       <a:xfrm>
-                        <a:off x="5484813" y="3303242"/>
-                        <a:ext cx="190500" cy="368300"/>
+                        <a:off x="5448824" y="3031304"/>
+                        <a:ext cx="397854" cy="640238"/>
                       </a:xfrm>
                       <a:prstGeom prst="rect">
                         <a:avLst/>
@@ -24160,7 +24141,7 @@
           <a:graphicData uri="http://schemas.openxmlformats.org/presentationml/2006/ole">
             <mc:AlternateContent xmlns:mc="http://schemas.openxmlformats.org/markup-compatibility/2006">
               <mc:Choice xmlns:v="urn:schemas-microsoft-com:vml" Requires="v">
-                <p:oleObj spid="_x0000_s321568" name="Equation" r:id="rId4" imgW="1765080" imgH="838080" progId="Equation.DSMT4">
+                <p:oleObj spid="_x0000_s321571" name="Equation" r:id="rId4" imgW="1765080" imgH="838080" progId="Equation.DSMT4">
                   <p:embed/>
                 </p:oleObj>
               </mc:Choice>
@@ -24592,7 +24573,7 @@
           <a:graphicData uri="http://schemas.openxmlformats.org/presentationml/2006/ole">
             <mc:AlternateContent xmlns:mc="http://schemas.openxmlformats.org/markup-compatibility/2006">
               <mc:Choice xmlns:v="urn:schemas-microsoft-com:vml" Requires="v">
-                <p:oleObj spid="_x0000_s322620" name="Equation" r:id="rId4" imgW="1930320" imgH="444240" progId="Equation.DSMT4">
+                <p:oleObj spid="_x0000_s322626" name="Equation" r:id="rId4" imgW="1930320" imgH="444240" progId="Equation.DSMT4">
                   <p:embed/>
                 </p:oleObj>
               </mc:Choice>
@@ -24662,7 +24643,7 @@
           <a:graphicData uri="http://schemas.openxmlformats.org/presentationml/2006/ole">
             <mc:AlternateContent xmlns:mc="http://schemas.openxmlformats.org/markup-compatibility/2006">
               <mc:Choice xmlns:v="urn:schemas-microsoft-com:vml" Requires="v">
-                <p:oleObj spid="_x0000_s322621" name="Equation" r:id="rId6" imgW="2057400" imgH="444240" progId="Equation.DSMT4">
+                <p:oleObj spid="_x0000_s322627" name="Equation" r:id="rId6" imgW="2057400" imgH="444240" progId="Equation.DSMT4">
                   <p:embed/>
                 </p:oleObj>
               </mc:Choice>
@@ -25023,7 +25004,7 @@
           <a:graphicData uri="http://schemas.openxmlformats.org/presentationml/2006/ole">
             <mc:AlternateContent xmlns:mc="http://schemas.openxmlformats.org/markup-compatibility/2006">
               <mc:Choice xmlns:v="urn:schemas-microsoft-com:vml" Requires="v">
-                <p:oleObj spid="_x0000_s323642" name="Equation" r:id="rId4" imgW="1422360" imgH="380880" progId="Equation.DSMT4">
+                <p:oleObj spid="_x0000_s323648" name="Equation" r:id="rId4" imgW="1422360" imgH="380880" progId="Equation.DSMT4">
                   <p:embed/>
                 </p:oleObj>
               </mc:Choice>
@@ -25085,7 +25066,7 @@
           <a:graphicData uri="http://schemas.openxmlformats.org/presentationml/2006/ole">
             <mc:AlternateContent xmlns:mc="http://schemas.openxmlformats.org/markup-compatibility/2006">
               <mc:Choice xmlns:v="urn:schemas-microsoft-com:vml" Requires="v">
-                <p:oleObj spid="_x0000_s323643" name="Equation" r:id="rId6" imgW="1054080" imgH="787320" progId="Equation.DSMT4">
+                <p:oleObj spid="_x0000_s323649" name="Equation" r:id="rId6" imgW="1054080" imgH="787320" progId="Equation.DSMT4">
                   <p:embed/>
                 </p:oleObj>
               </mc:Choice>
@@ -25289,7 +25270,7 @@
           <a:graphicData uri="http://schemas.openxmlformats.org/presentationml/2006/ole">
             <mc:AlternateContent xmlns:mc="http://schemas.openxmlformats.org/markup-compatibility/2006">
               <mc:Choice xmlns:v="urn:schemas-microsoft-com:vml" Requires="v">
-                <p:oleObj spid="_x0000_s325660" name="Equation" r:id="rId3" imgW="3581280" imgH="2743200" progId="Equation.DSMT4">
+                <p:oleObj spid="_x0000_s325663" name="Equation" r:id="rId3" imgW="3581280" imgH="2743200" progId="Equation.DSMT4">
                   <p:embed/>
                 </p:oleObj>
               </mc:Choice>
@@ -25532,7 +25513,7 @@
           <a:graphicData uri="http://schemas.openxmlformats.org/presentationml/2006/ole">
             <mc:AlternateContent xmlns:mc="http://schemas.openxmlformats.org/markup-compatibility/2006">
               <mc:Choice xmlns:v="urn:schemas-microsoft-com:vml" Requires="v">
-                <p:oleObj spid="_x0000_s326708" name="Equation" r:id="rId3" imgW="2349360" imgH="1295280" progId="Equation.DSMT4">
+                <p:oleObj spid="_x0000_s326714" name="Equation" r:id="rId3" imgW="2349360" imgH="1295280" progId="Equation.DSMT4">
                   <p:embed/>
                 </p:oleObj>
               </mc:Choice>
@@ -25595,7 +25576,7 @@
           <a:graphicData uri="http://schemas.openxmlformats.org/presentationml/2006/ole">
             <mc:AlternateContent xmlns:mc="http://schemas.openxmlformats.org/markup-compatibility/2006">
               <mc:Choice xmlns:v="urn:schemas-microsoft-com:vml" Requires="v">
-                <p:oleObj spid="_x0000_s326709" name="Equation" r:id="rId5" imgW="2019240" imgH="583920" progId="Equation.DSMT4">
+                <p:oleObj spid="_x0000_s326715" name="Equation" r:id="rId5" imgW="2019240" imgH="583920" progId="Equation.DSMT4">
                   <p:embed/>
                 </p:oleObj>
               </mc:Choice>
@@ -25852,7 +25833,7 @@
           <a:graphicData uri="http://schemas.openxmlformats.org/presentationml/2006/ole">
             <mc:AlternateContent xmlns:mc="http://schemas.openxmlformats.org/markup-compatibility/2006">
               <mc:Choice xmlns:v="urn:schemas-microsoft-com:vml" Requires="v">
-                <p:oleObj spid="_x0000_s327728" name="Equation" r:id="rId3" imgW="2184120" imgH="863280" progId="Equation.DSMT4">
+                <p:oleObj spid="_x0000_s327734" name="Equation" r:id="rId3" imgW="2184120" imgH="863280" progId="Equation.DSMT4">
                   <p:embed/>
                 </p:oleObj>
               </mc:Choice>
@@ -25922,7 +25903,7 @@
           <a:graphicData uri="http://schemas.openxmlformats.org/presentationml/2006/ole">
             <mc:AlternateContent xmlns:mc="http://schemas.openxmlformats.org/markup-compatibility/2006">
               <mc:Choice xmlns:v="urn:schemas-microsoft-com:vml" Requires="v">
-                <p:oleObj spid="_x0000_s327729" name="Equation" r:id="rId5" imgW="380880" imgH="368280" progId="Equation.DSMT4">
+                <p:oleObj spid="_x0000_s327735" name="Equation" r:id="rId5" imgW="380880" imgH="368280" progId="Equation.DSMT4">
                   <p:embed/>
                 </p:oleObj>
               </mc:Choice>
@@ -26199,7 +26180,7 @@
           <a:graphicData uri="http://schemas.openxmlformats.org/presentationml/2006/ole">
             <mc:AlternateContent xmlns:mc="http://schemas.openxmlformats.org/markup-compatibility/2006">
               <mc:Choice xmlns:v="urn:schemas-microsoft-com:vml" Requires="v">
-                <p:oleObj spid="_x0000_s328798" name="Equation" r:id="rId3" imgW="2920680" imgH="2336760" progId="Equation.DSMT4">
+                <p:oleObj spid="_x0000_s328810" name="Equation" r:id="rId3" imgW="2920680" imgH="2336760" progId="Equation.DSMT4">
                   <p:embed/>
                 </p:oleObj>
               </mc:Choice>
@@ -26262,7 +26243,7 @@
           <a:graphicData uri="http://schemas.openxmlformats.org/presentationml/2006/ole">
             <mc:AlternateContent xmlns:mc="http://schemas.openxmlformats.org/markup-compatibility/2006">
               <mc:Choice xmlns:v="urn:schemas-microsoft-com:vml" Requires="v">
-                <p:oleObj spid="_x0000_s328799" name="Equation" r:id="rId5" imgW="2158920" imgH="583920" progId="Equation.DSMT4">
+                <p:oleObj spid="_x0000_s328811" name="Equation" r:id="rId5" imgW="2158920" imgH="583920" progId="Equation.DSMT4">
                   <p:embed/>
                 </p:oleObj>
               </mc:Choice>
@@ -26325,7 +26306,7 @@
           <a:graphicData uri="http://schemas.openxmlformats.org/presentationml/2006/ole">
             <mc:AlternateContent xmlns:mc="http://schemas.openxmlformats.org/markup-compatibility/2006">
               <mc:Choice xmlns:v="urn:schemas-microsoft-com:vml" Requires="v">
-                <p:oleObj spid="_x0000_s328800" name="Equation" r:id="rId7" imgW="1981080" imgH="787320" progId="Equation.DSMT4">
+                <p:oleObj spid="_x0000_s328812" name="Equation" r:id="rId7" imgW="1981080" imgH="787320" progId="Equation.DSMT4">
                   <p:embed/>
                 </p:oleObj>
               </mc:Choice>
@@ -26395,7 +26376,7 @@
           <a:graphicData uri="http://schemas.openxmlformats.org/presentationml/2006/ole">
             <mc:AlternateContent xmlns:mc="http://schemas.openxmlformats.org/markup-compatibility/2006">
               <mc:Choice xmlns:v="urn:schemas-microsoft-com:vml" Requires="v">
-                <p:oleObj spid="_x0000_s328801" name="Equation" r:id="rId9" imgW="203040" imgH="368280" progId="Equation.DSMT4">
+                <p:oleObj spid="_x0000_s328813" name="Equation" r:id="rId9" imgW="203040" imgH="368280" progId="Equation.DSMT4">
                   <p:embed/>
                 </p:oleObj>
               </mc:Choice>
@@ -26796,7 +26777,7 @@
           <a:graphicData uri="http://schemas.openxmlformats.org/presentationml/2006/ole">
             <mc:AlternateContent xmlns:mc="http://schemas.openxmlformats.org/markup-compatibility/2006">
               <mc:Choice xmlns:v="urn:schemas-microsoft-com:vml" Requires="v">
-                <p:oleObj spid="_x0000_s333850" name="Equation" r:id="rId3" imgW="1765080" imgH="888840" progId="Equation.DSMT4">
+                <p:oleObj spid="_x0000_s333856" name="Equation" r:id="rId3" imgW="1765080" imgH="888840" progId="Equation.DSMT4">
                   <p:embed/>
                 </p:oleObj>
               </mc:Choice>
@@ -26937,7 +26918,7 @@
             <a:graphicData uri="http://schemas.openxmlformats.org/presentationml/2006/ole">
               <mc:AlternateContent xmlns:mc="http://schemas.openxmlformats.org/markup-compatibility/2006">
                 <mc:Choice xmlns:v="urn:schemas-microsoft-com:vml" Requires="v">
-                  <p:oleObj spid="_x0000_s333851" name="Equation" r:id="rId6" imgW="355320" imgH="330120" progId="Equation.DSMT4">
+                  <p:oleObj spid="_x0000_s333857" name="Equation" r:id="rId6" imgW="355320" imgH="330120" progId="Equation.DSMT4">
                     <p:embed/>
                   </p:oleObj>
                 </mc:Choice>
@@ -27230,7 +27211,7 @@
           <a:graphicData uri="http://schemas.openxmlformats.org/presentationml/2006/ole">
             <mc:AlternateContent xmlns:mc="http://schemas.openxmlformats.org/markup-compatibility/2006">
               <mc:Choice xmlns:v="urn:schemas-microsoft-com:vml" Requires="v">
-                <p:oleObj spid="_x0000_s334908" name="Equation" r:id="rId3" imgW="2730240" imgH="660240" progId="Equation.DSMT4">
+                <p:oleObj spid="_x0000_s334923" name="Equation" r:id="rId3" imgW="2730240" imgH="660240" progId="Equation.DSMT4">
                   <p:embed/>
                 </p:oleObj>
               </mc:Choice>
@@ -27293,7 +27274,7 @@
           <a:graphicData uri="http://schemas.openxmlformats.org/presentationml/2006/ole">
             <mc:AlternateContent xmlns:mc="http://schemas.openxmlformats.org/markup-compatibility/2006">
               <mc:Choice xmlns:v="urn:schemas-microsoft-com:vml" Requires="v">
-                <p:oleObj spid="_x0000_s334909" name="Equation" r:id="rId5" imgW="3746160" imgH="850680" progId="Equation.DSMT4">
+                <p:oleObj spid="_x0000_s334924" name="Equation" r:id="rId5" imgW="3746160" imgH="850680" progId="Equation.DSMT4">
                   <p:embed/>
                 </p:oleObj>
               </mc:Choice>
@@ -27356,7 +27337,7 @@
           <a:graphicData uri="http://schemas.openxmlformats.org/presentationml/2006/ole">
             <mc:AlternateContent xmlns:mc="http://schemas.openxmlformats.org/markup-compatibility/2006">
               <mc:Choice xmlns:v="urn:schemas-microsoft-com:vml" Requires="v">
-                <p:oleObj spid="_x0000_s334910" name="Equation" r:id="rId7" imgW="1054080" imgH="380880" progId="Equation.DSMT4">
+                <p:oleObj spid="_x0000_s334925" name="Equation" r:id="rId7" imgW="1054080" imgH="380880" progId="Equation.DSMT4">
                   <p:embed/>
                 </p:oleObj>
               </mc:Choice>
@@ -27419,7 +27400,7 @@
           <a:graphicData uri="http://schemas.openxmlformats.org/presentationml/2006/ole">
             <mc:AlternateContent xmlns:mc="http://schemas.openxmlformats.org/markup-compatibility/2006">
               <mc:Choice xmlns:v="urn:schemas-microsoft-com:vml" Requires="v">
-                <p:oleObj spid="_x0000_s334911" name="Equation" r:id="rId9" imgW="1917360" imgH="380880" progId="Equation.DSMT4">
+                <p:oleObj spid="_x0000_s334926" name="Equation" r:id="rId9" imgW="1917360" imgH="380880" progId="Equation.DSMT4">
                   <p:embed/>
                 </p:oleObj>
               </mc:Choice>
@@ -27482,7 +27463,7 @@
           <a:graphicData uri="http://schemas.openxmlformats.org/presentationml/2006/ole">
             <mc:AlternateContent xmlns:mc="http://schemas.openxmlformats.org/markup-compatibility/2006">
               <mc:Choice xmlns:v="urn:schemas-microsoft-com:vml" Requires="v">
-                <p:oleObj spid="_x0000_s334912" name="Equation" r:id="rId11" imgW="2527200" imgH="419040" progId="Equation.DSMT4">
+                <p:oleObj spid="_x0000_s334927" name="Equation" r:id="rId11" imgW="2527200" imgH="419040" progId="Equation.DSMT4">
                   <p:embed/>
                 </p:oleObj>
               </mc:Choice>
@@ -28371,7 +28352,7 @@
           <a:graphicData uri="http://schemas.openxmlformats.org/presentationml/2006/ole">
             <mc:AlternateContent xmlns:mc="http://schemas.openxmlformats.org/markup-compatibility/2006">
               <mc:Choice xmlns:v="urn:schemas-microsoft-com:vml" Requires="v">
-                <p:oleObj spid="_x0000_s265518" name="Equation" r:id="rId3" imgW="1485720" imgH="380880" progId="Equation.DSMT4">
+                <p:oleObj spid="_x0000_s265533" name="Equation" r:id="rId3" imgW="1485720" imgH="380880" progId="Equation.DSMT4">
                   <p:embed/>
                 </p:oleObj>
               </mc:Choice>
@@ -28434,7 +28415,7 @@
           <a:graphicData uri="http://schemas.openxmlformats.org/presentationml/2006/ole">
             <mc:AlternateContent xmlns:mc="http://schemas.openxmlformats.org/markup-compatibility/2006">
               <mc:Choice xmlns:v="urn:schemas-microsoft-com:vml" Requires="v">
-                <p:oleObj spid="_x0000_s265519" name="Equation" r:id="rId5" imgW="393480" imgH="368280" progId="Equation.DSMT4">
+                <p:oleObj spid="_x0000_s265534" name="Equation" r:id="rId5" imgW="393480" imgH="368280" progId="Equation.DSMT4">
                   <p:embed/>
                 </p:oleObj>
               </mc:Choice>
@@ -28963,7 +28944,7 @@
             <a:graphicData uri="http://schemas.openxmlformats.org/presentationml/2006/ole">
               <mc:AlternateContent xmlns:mc="http://schemas.openxmlformats.org/markup-compatibility/2006">
                 <mc:Choice xmlns:v="urn:schemas-microsoft-com:vml" Requires="v">
-                  <p:oleObj spid="_x0000_s265520" name="Equation" r:id="rId7" imgW="342720" imgH="317160" progId="Equation.DSMT4">
+                  <p:oleObj spid="_x0000_s265535" name="Equation" r:id="rId7" imgW="342720" imgH="317160" progId="Equation.DSMT4">
                     <p:embed/>
                   </p:oleObj>
                 </mc:Choice>
@@ -29026,7 +29007,7 @@
             <a:graphicData uri="http://schemas.openxmlformats.org/presentationml/2006/ole">
               <mc:AlternateContent xmlns:mc="http://schemas.openxmlformats.org/markup-compatibility/2006">
                 <mc:Choice xmlns:v="urn:schemas-microsoft-com:vml" Requires="v">
-                  <p:oleObj spid="_x0000_s265521" name="Equation" r:id="rId9" imgW="228600" imgH="330120" progId="Equation.DSMT4">
+                  <p:oleObj spid="_x0000_s265536" name="Equation" r:id="rId9" imgW="228600" imgH="330120" progId="Equation.DSMT4">
                     <p:embed/>
                   </p:oleObj>
                 </mc:Choice>
@@ -29089,7 +29070,7 @@
             <a:graphicData uri="http://schemas.openxmlformats.org/presentationml/2006/ole">
               <mc:AlternateContent xmlns:mc="http://schemas.openxmlformats.org/markup-compatibility/2006">
                 <mc:Choice xmlns:v="urn:schemas-microsoft-com:vml" Requires="v">
-                  <p:oleObj spid="_x0000_s265522" name="Equation" r:id="rId11" imgW="253800" imgH="330120" progId="Equation.DSMT4">
+                  <p:oleObj spid="_x0000_s265537" name="Equation" r:id="rId11" imgW="253800" imgH="330120" progId="Equation.DSMT4">
                     <p:embed/>
                   </p:oleObj>
                 </mc:Choice>
@@ -29898,7 +29879,7 @@
           <a:graphicData uri="http://schemas.openxmlformats.org/presentationml/2006/ole">
             <mc:AlternateContent xmlns:mc="http://schemas.openxmlformats.org/markup-compatibility/2006">
               <mc:Choice xmlns:v="urn:schemas-microsoft-com:vml" Requires="v">
-                <p:oleObj spid="_x0000_s332817" name="Equation" r:id="rId3" imgW="4305240" imgH="2743200" progId="Equation.DSMT4">
+                <p:oleObj spid="_x0000_s332820" name="Equation" r:id="rId3" imgW="4305240" imgH="2743200" progId="Equation.DSMT4">
                   <p:embed/>
                 </p:oleObj>
               </mc:Choice>
@@ -31007,7 +30988,7 @@
           <a:graphicData uri="http://schemas.openxmlformats.org/presentationml/2006/ole">
             <mc:AlternateContent xmlns:mc="http://schemas.openxmlformats.org/markup-compatibility/2006">
               <mc:Choice xmlns:v="urn:schemas-microsoft-com:vml" Requires="v">
-                <p:oleObj spid="_x0000_s266547" name="Equation" r:id="rId3" imgW="1485720" imgH="380880" progId="Equation.DSMT4">
+                <p:oleObj spid="_x0000_s266562" name="Equation" r:id="rId3" imgW="1485720" imgH="380880" progId="Equation.DSMT4">
                   <p:embed/>
                 </p:oleObj>
               </mc:Choice>
@@ -31070,7 +31051,7 @@
           <a:graphicData uri="http://schemas.openxmlformats.org/presentationml/2006/ole">
             <mc:AlternateContent xmlns:mc="http://schemas.openxmlformats.org/markup-compatibility/2006">
               <mc:Choice xmlns:v="urn:schemas-microsoft-com:vml" Requires="v">
-                <p:oleObj spid="_x0000_s266548" name="Equation" r:id="rId5" imgW="393480" imgH="368280" progId="Equation.DSMT4">
+                <p:oleObj spid="_x0000_s266563" name="Equation" r:id="rId5" imgW="393480" imgH="368280" progId="Equation.DSMT4">
                   <p:embed/>
                 </p:oleObj>
               </mc:Choice>
@@ -31526,7 +31507,7 @@
             <a:graphicData uri="http://schemas.openxmlformats.org/presentationml/2006/ole">
               <mc:AlternateContent xmlns:mc="http://schemas.openxmlformats.org/markup-compatibility/2006">
                 <mc:Choice xmlns:v="urn:schemas-microsoft-com:vml" Requires="v">
-                  <p:oleObj spid="_x0000_s266549" name="Equation" r:id="rId7" imgW="482400" imgH="317160" progId="Equation.DSMT4">
+                  <p:oleObj spid="_x0000_s266564" name="Equation" r:id="rId7" imgW="482400" imgH="317160" progId="Equation.DSMT4">
                     <p:embed/>
                   </p:oleObj>
                 </mc:Choice>
@@ -31589,7 +31570,7 @@
             <a:graphicData uri="http://schemas.openxmlformats.org/presentationml/2006/ole">
               <mc:AlternateContent xmlns:mc="http://schemas.openxmlformats.org/markup-compatibility/2006">
                 <mc:Choice xmlns:v="urn:schemas-microsoft-com:vml" Requires="v">
-                  <p:oleObj spid="_x0000_s266550" name="Equation" r:id="rId9" imgW="253800" imgH="330120" progId="Equation.DSMT4">
+                  <p:oleObj spid="_x0000_s266565" name="Equation" r:id="rId9" imgW="253800" imgH="330120" progId="Equation.DSMT4">
                     <p:embed/>
                   </p:oleObj>
                 </mc:Choice>
@@ -31652,7 +31633,7 @@
             <a:graphicData uri="http://schemas.openxmlformats.org/presentationml/2006/ole">
               <mc:AlternateContent xmlns:mc="http://schemas.openxmlformats.org/markup-compatibility/2006">
                 <mc:Choice xmlns:v="urn:schemas-microsoft-com:vml" Requires="v">
-                  <p:oleObj spid="_x0000_s266551" name="Equation" r:id="rId11" imgW="228600" imgH="330120" progId="Equation.DSMT4">
+                  <p:oleObj spid="_x0000_s266566" name="Equation" r:id="rId11" imgW="228600" imgH="330120" progId="Equation.DSMT4">
                     <p:embed/>
                   </p:oleObj>
                 </mc:Choice>
@@ -32421,7 +32402,7 @@
             <a:graphicData uri="http://schemas.openxmlformats.org/presentationml/2006/ole">
               <mc:AlternateContent xmlns:mc="http://schemas.openxmlformats.org/markup-compatibility/2006">
                 <mc:Choice xmlns:v="urn:schemas-microsoft-com:vml" Requires="v">
-                  <p:oleObj spid="_x0000_s302200" name="Equation" r:id="rId3" imgW="342720" imgH="317160" progId="Equation.DSMT4">
+                  <p:oleObj spid="_x0000_s302206" name="Equation" r:id="rId3" imgW="342720" imgH="317160" progId="Equation.DSMT4">
                     <p:embed/>
                   </p:oleObj>
                 </mc:Choice>
@@ -32484,7 +32465,7 @@
             <a:graphicData uri="http://schemas.openxmlformats.org/presentationml/2006/ole">
               <mc:AlternateContent xmlns:mc="http://schemas.openxmlformats.org/markup-compatibility/2006">
                 <mc:Choice xmlns:v="urn:schemas-microsoft-com:vml" Requires="v">
-                  <p:oleObj spid="_x0000_s302201" name="Equation" r:id="rId5" imgW="482400" imgH="317160" progId="Equation.DSMT4">
+                  <p:oleObj spid="_x0000_s302207" name="Equation" r:id="rId5" imgW="482400" imgH="317160" progId="Equation.DSMT4">
                     <p:embed/>
                   </p:oleObj>
                 </mc:Choice>
@@ -32817,7 +32798,7 @@
           <a:graphicData uri="http://schemas.openxmlformats.org/presentationml/2006/ole">
             <mc:AlternateContent xmlns:mc="http://schemas.openxmlformats.org/markup-compatibility/2006">
               <mc:Choice xmlns:v="urn:schemas-microsoft-com:vml" Requires="v">
-                <p:oleObj spid="_x0000_s303406" name="Equation" r:id="rId3" imgW="2438280" imgH="863280" progId="Equation.DSMT4">
+                <p:oleObj spid="_x0000_s303421" name="Equation" r:id="rId3" imgW="2438280" imgH="863280" progId="Equation.DSMT4">
                   <p:embed/>
                 </p:oleObj>
               </mc:Choice>
@@ -32880,7 +32861,7 @@
           <a:graphicData uri="http://schemas.openxmlformats.org/presentationml/2006/ole">
             <mc:AlternateContent xmlns:mc="http://schemas.openxmlformats.org/markup-compatibility/2006">
               <mc:Choice xmlns:v="urn:schemas-microsoft-com:vml" Requires="v">
-                <p:oleObj spid="_x0000_s303407" name="Equation" r:id="rId5" imgW="393480" imgH="368280" progId="Equation.DSMT4">
+                <p:oleObj spid="_x0000_s303422" name="Equation" r:id="rId5" imgW="393480" imgH="368280" progId="Equation.DSMT4">
                   <p:embed/>
                 </p:oleObj>
               </mc:Choice>
@@ -32943,7 +32924,7 @@
           <a:graphicData uri="http://schemas.openxmlformats.org/presentationml/2006/ole">
             <mc:AlternateContent xmlns:mc="http://schemas.openxmlformats.org/markup-compatibility/2006">
               <mc:Choice xmlns:v="urn:schemas-microsoft-com:vml" Requires="v">
-                <p:oleObj spid="_x0000_s303408" name="Equation" r:id="rId7" imgW="507960" imgH="380880" progId="Equation.DSMT4">
+                <p:oleObj spid="_x0000_s303423" name="Equation" r:id="rId7" imgW="507960" imgH="380880" progId="Equation.DSMT4">
                   <p:embed/>
                 </p:oleObj>
               </mc:Choice>
@@ -33513,7 +33494,7 @@
             <a:graphicData uri="http://schemas.openxmlformats.org/presentationml/2006/ole">
               <mc:AlternateContent xmlns:mc="http://schemas.openxmlformats.org/markup-compatibility/2006">
                 <mc:Choice xmlns:v="urn:schemas-microsoft-com:vml" Requires="v">
-                  <p:oleObj spid="_x0000_s303409" name="Equation" r:id="rId10" imgW="342720" imgH="317160" progId="Equation.DSMT4">
+                  <p:oleObj spid="_x0000_s303424" name="Equation" r:id="rId10" imgW="342720" imgH="317160" progId="Equation.DSMT4">
                     <p:embed/>
                   </p:oleObj>
                 </mc:Choice>
@@ -33576,7 +33557,7 @@
             <a:graphicData uri="http://schemas.openxmlformats.org/presentationml/2006/ole">
               <mc:AlternateContent xmlns:mc="http://schemas.openxmlformats.org/markup-compatibility/2006">
                 <mc:Choice xmlns:v="urn:schemas-microsoft-com:vml" Requires="v">
-                  <p:oleObj spid="_x0000_s303410" name="Equation" r:id="rId12" imgW="431640" imgH="330120" progId="Equation.DSMT4">
+                  <p:oleObj spid="_x0000_s303425" name="Equation" r:id="rId12" imgW="431640" imgH="330120" progId="Equation.DSMT4">
                     <p:embed/>
                   </p:oleObj>
                 </mc:Choice>
@@ -33904,7 +33885,7 @@
           <a:graphicData uri="http://schemas.openxmlformats.org/presentationml/2006/ole">
             <mc:AlternateContent xmlns:mc="http://schemas.openxmlformats.org/markup-compatibility/2006">
               <mc:Choice xmlns:v="urn:schemas-microsoft-com:vml" Requires="v">
-                <p:oleObj spid="_x0000_s304310" name="Equation" r:id="rId3" imgW="2705040" imgH="863280" progId="Equation.DSMT4">
+                <p:oleObj spid="_x0000_s304319" name="Equation" r:id="rId3" imgW="2705040" imgH="863280" progId="Equation.DSMT4">
                   <p:embed/>
                 </p:oleObj>
               </mc:Choice>
@@ -34473,7 +34454,7 @@
             <a:graphicData uri="http://schemas.openxmlformats.org/presentationml/2006/ole">
               <mc:AlternateContent xmlns:mc="http://schemas.openxmlformats.org/markup-compatibility/2006">
                 <mc:Choice xmlns:v="urn:schemas-microsoft-com:vml" Requires="v">
-                  <p:oleObj spid="_x0000_s304311" name="Equation" r:id="rId6" imgW="482400" imgH="317160" progId="Equation.DSMT4">
+                  <p:oleObj spid="_x0000_s304320" name="Equation" r:id="rId6" imgW="482400" imgH="317160" progId="Equation.DSMT4">
                     <p:embed/>
                   </p:oleObj>
                 </mc:Choice>
@@ -34536,7 +34517,7 @@
             <a:graphicData uri="http://schemas.openxmlformats.org/presentationml/2006/ole">
               <mc:AlternateContent xmlns:mc="http://schemas.openxmlformats.org/markup-compatibility/2006">
                 <mc:Choice xmlns:v="urn:schemas-microsoft-com:vml" Requires="v">
-                  <p:oleObj spid="_x0000_s304312" name="Equation" r:id="rId8" imgW="583920" imgH="330120" progId="Equation.DSMT4">
+                  <p:oleObj spid="_x0000_s304321" name="Equation" r:id="rId8" imgW="583920" imgH="330120" progId="Equation.DSMT4">
                     <p:embed/>
                   </p:oleObj>
                 </mc:Choice>

</xml_diff>